<commit_message>
added leap logo and push transition, final
</commit_message>
<xml_diff>
--- a/doc/presentation/soleap.pptx
+++ b/doc/presentation/soleap.pptx
@@ -7637,6 +7637,16 @@
   <p:clrMapOvr>
     <a:masterClrMapping/>
   </p:clrMapOvr>
+  <p:transition spd="slow">
+    <p:push dir="u"/>
+  </p:transition>
+  <p:timing>
+    <p:tnLst>
+      <p:par>
+        <p:cTn id="1" dur="indefinite" restart="never" nodeType="tmRoot"/>
+      </p:par>
+    </p:tnLst>
+  </p:timing>
 </p:sld>
 </file>
 
@@ -7719,6 +7729,9 @@
   <p:clrMapOvr>
     <a:masterClrMapping/>
   </p:clrMapOvr>
+  <p:transition spd="slow">
+    <p:push dir="u"/>
+  </p:transition>
 </p:sld>
 </file>
 
@@ -7801,6 +7814,9 @@
   <p:clrMapOvr>
     <a:masterClrMapping/>
   </p:clrMapOvr>
+  <p:transition spd="slow">
+    <p:push dir="u"/>
+  </p:transition>
 </p:sld>
 </file>
 
@@ -7887,6 +7903,9 @@
   <p:clrMapOvr>
     <a:masterClrMapping/>
   </p:clrMapOvr>
+  <p:transition spd="slow">
+    <p:push dir="u"/>
+  </p:transition>
 </p:sld>
 </file>
 
@@ -8015,6 +8034,9 @@
   <p:clrMapOvr>
     <a:masterClrMapping/>
   </p:clrMapOvr>
+  <p:transition spd="slow">
+    <p:push dir="u"/>
+  </p:transition>
 </p:sld>
 </file>
 
@@ -8081,15 +8103,7 @@
           <a:p>
             <a:r>
               <a:rPr lang="de-AT" dirty="0" smtClean="0"/>
-              <a:t>Aufbau diverser Test </a:t>
-            </a:r>
-            <a:r>
-              <a:rPr lang="de-AT" dirty="0" smtClean="0"/>
-              <a:t>S</a:t>
-            </a:r>
-            <a:r>
-              <a:rPr lang="de-AT" dirty="0" smtClean="0"/>
-              <a:t>zenarien</a:t>
+              <a:t>Aufbau diverser Test Szenarien</a:t>
             </a:r>
           </a:p>
           <a:p>
@@ -8119,7 +8133,6 @@
               <a:rPr lang="de-AT" dirty="0" smtClean="0"/>
               <a:t>werfen</a:t>
             </a:r>
-            <a:endParaRPr lang="de-AT" dirty="0" smtClean="0"/>
           </a:p>
           <a:p>
             <a:pPr lvl="2"/>
@@ -8140,7 +8153,6 @@
               <a:rPr lang="de-AT" dirty="0" smtClean="0"/>
               <a:t>Evaluierung</a:t>
             </a:r>
-            <a:endParaRPr lang="de-AT" dirty="0" smtClean="0"/>
           </a:p>
         </p:txBody>
       </p:sp>
@@ -8154,6 +8166,16 @@
   <p:clrMapOvr>
     <a:masterClrMapping/>
   </p:clrMapOvr>
+  <p:transition spd="slow">
+    <p:push dir="u"/>
+  </p:transition>
+  <p:timing>
+    <p:tnLst>
+      <p:par>
+        <p:cTn id="1" dur="indefinite" restart="never" nodeType="tmRoot"/>
+      </p:par>
+    </p:tnLst>
+  </p:timing>
 </p:sld>
 </file>
 
@@ -8236,7 +8258,7 @@
         </p:blipFill>
         <p:spPr>
           <a:xfrm>
-            <a:off x="846611" y="2937122"/>
+            <a:off x="561939" y="2359153"/>
             <a:ext cx="4976523" cy="3527050"/>
           </a:xfrm>
         </p:spPr>
@@ -8263,8 +8285,38 @@
         </p:blipFill>
         <p:spPr>
           <a:xfrm>
-            <a:off x="4503293" y="1690689"/>
+            <a:off x="4572000" y="1773109"/>
             <a:ext cx="4012057" cy="2492867"/>
+          </a:xfrm>
+          <a:prstGeom prst="rect">
+            <a:avLst/>
+          </a:prstGeom>
+        </p:spPr>
+      </p:pic>
+      <p:pic>
+        <p:nvPicPr>
+          <p:cNvPr id="3" name="Picture 2"/>
+          <p:cNvPicPr>
+            <a:picLocks noChangeAspect="1"/>
+          </p:cNvPicPr>
+          <p:nvPr/>
+        </p:nvPicPr>
+        <p:blipFill>
+          <a:blip r:embed="rId4" cstate="print">
+            <a:extLst>
+              <a:ext uri="{28A0092B-C50C-407E-A947-70E740481C1C}">
+                <a14:useLocalDpi xmlns:a14="http://schemas.microsoft.com/office/drawing/2010/main" val="0"/>
+              </a:ext>
+            </a:extLst>
+          </a:blip>
+          <a:stretch>
+            <a:fillRect/>
+          </a:stretch>
+        </p:blipFill>
+        <p:spPr>
+          <a:xfrm>
+            <a:off x="5184474" y="3837979"/>
+            <a:ext cx="4770408" cy="3020021"/>
           </a:xfrm>
           <a:prstGeom prst="rect">
             <a:avLst/>
@@ -8281,6 +8333,16 @@
   <p:clrMapOvr>
     <a:masterClrMapping/>
   </p:clrMapOvr>
+  <p:transition spd="slow">
+    <p:push dir="u"/>
+  </p:transition>
+  <p:timing>
+    <p:tnLst>
+      <p:par>
+        <p:cTn id="1" dur="indefinite" restart="never" nodeType="tmRoot"/>
+      </p:par>
+    </p:tnLst>
+  </p:timing>
 </p:sld>
 </file>
 
@@ -8422,6 +8484,16 @@
   <p:clrMapOvr>
     <a:masterClrMapping/>
   </p:clrMapOvr>
+  <p:transition spd="slow">
+    <p:push dir="u"/>
+  </p:transition>
+  <p:timing>
+    <p:tnLst>
+      <p:par>
+        <p:cTn id="1" dur="indefinite" restart="never" nodeType="tmRoot"/>
+      </p:par>
+    </p:tnLst>
+  </p:timing>
 </p:sld>
 </file>
 
@@ -8504,6 +8576,16 @@
   <p:clrMapOvr>
     <a:masterClrMapping/>
   </p:clrMapOvr>
+  <p:transition spd="slow">
+    <p:push dir="u"/>
+  </p:transition>
+  <p:timing>
+    <p:tnLst>
+      <p:par>
+        <p:cTn id="1" dur="indefinite" restart="never" nodeType="tmRoot"/>
+      </p:par>
+    </p:tnLst>
+  </p:timing>
 </p:sld>
 </file>
 
@@ -8653,6 +8735,16 @@
   <p:clrMapOvr>
     <a:masterClrMapping/>
   </p:clrMapOvr>
+  <p:transition spd="slow">
+    <p:push dir="u"/>
+  </p:transition>
+  <p:timing>
+    <p:tnLst>
+      <p:par>
+        <p:cTn id="1" dur="indefinite" restart="never" nodeType="tmRoot"/>
+      </p:par>
+    </p:tnLst>
+  </p:timing>
 </p:sld>
 </file>
 
@@ -8690,11 +8782,7 @@
           <a:p>
             <a:r>
               <a:rPr lang="de-AT" dirty="0" smtClean="0"/>
-              <a:t>Demo </a:t>
-            </a:r>
-            <a:r>
-              <a:rPr lang="de-AT" dirty="0" smtClean="0"/>
-              <a:t>Applikation</a:t>
+              <a:t>Demo Applikation</a:t>
             </a:r>
             <a:endParaRPr lang="en-US" dirty="0"/>
           </a:p>
@@ -8739,6 +8827,16 @@
   <p:clrMapOvr>
     <a:masterClrMapping/>
   </p:clrMapOvr>
+  <p:transition spd="slow">
+    <p:push dir="u"/>
+  </p:transition>
+  <p:timing>
+    <p:tnLst>
+      <p:par>
+        <p:cTn id="1" dur="indefinite" restart="never" nodeType="tmRoot"/>
+      </p:par>
+    </p:tnLst>
+  </p:timing>
 </p:sld>
 </file>
 
@@ -8821,6 +8919,16 @@
   <p:clrMapOvr>
     <a:masterClrMapping/>
   </p:clrMapOvr>
+  <p:transition spd="slow">
+    <p:push dir="u"/>
+  </p:transition>
+  <p:timing>
+    <p:tnLst>
+      <p:par>
+        <p:cTn id="1" dur="indefinite" restart="never" nodeType="tmRoot"/>
+      </p:par>
+    </p:tnLst>
+  </p:timing>
 </p:sld>
 </file>
 
@@ -8903,6 +9011,16 @@
   <p:clrMapOvr>
     <a:masterClrMapping/>
   </p:clrMapOvr>
+  <p:transition spd="slow">
+    <p:push dir="u"/>
+  </p:transition>
+  <p:timing>
+    <p:tnLst>
+      <p:par>
+        <p:cTn id="1" dur="indefinite" restart="never" nodeType="tmRoot"/>
+      </p:par>
+    </p:tnLst>
+  </p:timing>
 </p:sld>
 </file>
 

</xml_diff>